<commit_message>
Poslato na pregled 2.10.2020.
</commit_message>
<xml_diff>
--- a/Stefan_Stojanovic_Bsc_ppt.pptx
+++ b/Stefan_Stojanovic_Bsc_ppt.pptx
@@ -11842,7 +11842,9 @@
         </p:nvSpPr>
         <p:spPr/>
         <p:txBody>
-          <a:bodyPr/>
+          <a:bodyPr>
+            <a:normAutofit lnSpcReduction="10000"/>
+          </a:bodyPr>
           <a:lstStyle/>
           <a:p>
             <a:r>
@@ -11860,6 +11862,16 @@
             <a:r>
               <a:rPr lang="sr-Latn-RS" dirty="0" smtClean="0"/>
               <a:t>Pri testiranju korišćene različite verzije Windows operativnog sistema (7, 8 i 10)</a:t>
+            </a:r>
+          </a:p>
+          <a:p>
+            <a:r>
+              <a:rPr lang="sr-Latn-RS" dirty="0" smtClean="0"/>
+              <a:t>Za kreiranje izvršne (.exe) datoteke korišćen </a:t>
+            </a:r>
+            <a:r>
+              <a:rPr lang="sr-Latn-RS" i="1" dirty="0" smtClean="0"/>
+              <a:t>PyInstaller</a:t>
             </a:r>
           </a:p>
           <a:p>

</xml_diff>